<commit_message>
readay for remote rerunning.
</commit_message>
<xml_diff>
--- a/paperfigures/method_summary_girds/all.pptx
+++ b/paperfigures/method_summary_girds/all.pptx
@@ -1,11 +1,19 @@
 
 <file path=ppt/presentation.xml><?xml version="1.0" encoding="utf-8"?>
-<p:presentation xmlns:a="http://schemas.openxmlformats.org/drawingml/2006/main" xmlns:r="http://schemas.openxmlformats.org/officeDocument/2006/relationships" xmlns:p="http://schemas.openxmlformats.org/presentationml/2006/main" saveSubsetFonts="1">
+<p:presentation xmlns:a="http://schemas.openxmlformats.org/drawingml/2006/main" xmlns:r="http://schemas.openxmlformats.org/officeDocument/2006/relationships" xmlns:p="http://schemas.openxmlformats.org/presentationml/2006/main" saveSubsetFonts="1" autoCompressPictures="0">
   <p:sldMasterIdLst>
     <p:sldMasterId id="2147483648" r:id="rId1"/>
   </p:sldMasterIdLst>
   <p:sldIdLst>
-    <p:sldId id="256" r:id="rId2"/>
+    <p:sldId id="257" r:id="rId2"/>
+    <p:sldId id="264" r:id="rId3"/>
+    <p:sldId id="256" r:id="rId4"/>
+    <p:sldId id="258" r:id="rId5"/>
+    <p:sldId id="259" r:id="rId6"/>
+    <p:sldId id="260" r:id="rId7"/>
+    <p:sldId id="261" r:id="rId8"/>
+    <p:sldId id="262" r:id="rId9"/>
+    <p:sldId id="263" r:id="rId10"/>
   </p:sldIdLst>
   <p:sldSz cx="12192000" cy="6858000"/>
   <p:notesSz cx="6858000" cy="9144000"/>
@@ -259,7 +267,7 @@
           <a:p>
             <a:fld id="{877DF627-6EE9-4CCA-AE1D-01C210C5ACE1}" type="datetimeFigureOut">
               <a:rPr lang="en-US" smtClean="0"/>
-              <a:t>10/2/2024</a:t>
+              <a:t>4/30/2025</a:t>
             </a:fld>
             <a:endParaRPr lang="en-US"/>
           </a:p>
@@ -457,7 +465,7 @@
           <a:p>
             <a:fld id="{877DF627-6EE9-4CCA-AE1D-01C210C5ACE1}" type="datetimeFigureOut">
               <a:rPr lang="en-US" smtClean="0"/>
-              <a:t>10/2/2024</a:t>
+              <a:t>4/30/2025</a:t>
             </a:fld>
             <a:endParaRPr lang="en-US"/>
           </a:p>
@@ -665,7 +673,7 @@
           <a:p>
             <a:fld id="{877DF627-6EE9-4CCA-AE1D-01C210C5ACE1}" type="datetimeFigureOut">
               <a:rPr lang="en-US" smtClean="0"/>
-              <a:t>10/2/2024</a:t>
+              <a:t>4/30/2025</a:t>
             </a:fld>
             <a:endParaRPr lang="en-US"/>
           </a:p>
@@ -863,7 +871,7 @@
           <a:p>
             <a:fld id="{877DF627-6EE9-4CCA-AE1D-01C210C5ACE1}" type="datetimeFigureOut">
               <a:rPr lang="en-US" smtClean="0"/>
-              <a:t>10/2/2024</a:t>
+              <a:t>4/30/2025</a:t>
             </a:fld>
             <a:endParaRPr lang="en-US"/>
           </a:p>
@@ -1138,7 +1146,7 @@
           <a:p>
             <a:fld id="{877DF627-6EE9-4CCA-AE1D-01C210C5ACE1}" type="datetimeFigureOut">
               <a:rPr lang="en-US" smtClean="0"/>
-              <a:t>10/2/2024</a:t>
+              <a:t>4/30/2025</a:t>
             </a:fld>
             <a:endParaRPr lang="en-US"/>
           </a:p>
@@ -1403,7 +1411,7 @@
           <a:p>
             <a:fld id="{877DF627-6EE9-4CCA-AE1D-01C210C5ACE1}" type="datetimeFigureOut">
               <a:rPr lang="en-US" smtClean="0"/>
-              <a:t>10/2/2024</a:t>
+              <a:t>4/30/2025</a:t>
             </a:fld>
             <a:endParaRPr lang="en-US"/>
           </a:p>
@@ -1815,7 +1823,7 @@
           <a:p>
             <a:fld id="{877DF627-6EE9-4CCA-AE1D-01C210C5ACE1}" type="datetimeFigureOut">
               <a:rPr lang="en-US" smtClean="0"/>
-              <a:t>10/2/2024</a:t>
+              <a:t>4/30/2025</a:t>
             </a:fld>
             <a:endParaRPr lang="en-US"/>
           </a:p>
@@ -1956,7 +1964,7 @@
           <a:p>
             <a:fld id="{877DF627-6EE9-4CCA-AE1D-01C210C5ACE1}" type="datetimeFigureOut">
               <a:rPr lang="en-US" smtClean="0"/>
-              <a:t>10/2/2024</a:t>
+              <a:t>4/30/2025</a:t>
             </a:fld>
             <a:endParaRPr lang="en-US"/>
           </a:p>
@@ -2069,7 +2077,7 @@
           <a:p>
             <a:fld id="{877DF627-6EE9-4CCA-AE1D-01C210C5ACE1}" type="datetimeFigureOut">
               <a:rPr lang="en-US" smtClean="0"/>
-              <a:t>10/2/2024</a:t>
+              <a:t>4/30/2025</a:t>
             </a:fld>
             <a:endParaRPr lang="en-US"/>
           </a:p>
@@ -2380,7 +2388,7 @@
           <a:p>
             <a:fld id="{877DF627-6EE9-4CCA-AE1D-01C210C5ACE1}" type="datetimeFigureOut">
               <a:rPr lang="en-US" smtClean="0"/>
-              <a:t>10/2/2024</a:t>
+              <a:t>4/30/2025</a:t>
             </a:fld>
             <a:endParaRPr lang="en-US"/>
           </a:p>
@@ -2668,7 +2676,7 @@
           <a:p>
             <a:fld id="{877DF627-6EE9-4CCA-AE1D-01C210C5ACE1}" type="datetimeFigureOut">
               <a:rPr lang="en-US" smtClean="0"/>
-              <a:t>10/2/2024</a:t>
+              <a:t>4/30/2025</a:t>
             </a:fld>
             <a:endParaRPr lang="en-US"/>
           </a:p>
@@ -2909,7 +2917,7 @@
           <a:p>
             <a:fld id="{877DF627-6EE9-4CCA-AE1D-01C210C5ACE1}" type="datetimeFigureOut">
               <a:rPr lang="en-US" smtClean="0"/>
-              <a:t>10/2/2024</a:t>
+              <a:t>4/30/2025</a:t>
             </a:fld>
             <a:endParaRPr lang="en-US"/>
           </a:p>
@@ -3314,6 +3322,1155 @@
   <p:cSld>
     <p:spTree>
       <p:nvGrpSpPr>
+        <p:cNvPr id="1" name="">
+          <a:extLst>
+            <a:ext uri="{FF2B5EF4-FFF2-40B4-BE49-F238E27FC236}">
+              <a16:creationId xmlns:a16="http://schemas.microsoft.com/office/drawing/2014/main" id="{696AFFAA-34AE-A867-88DF-28AD6FEDAC48}"/>
+            </a:ext>
+          </a:extLst>
+        </p:cNvPr>
+        <p:cNvGrpSpPr/>
+        <p:nvPr/>
+      </p:nvGrpSpPr>
+      <p:grpSpPr>
+        <a:xfrm>
+          <a:off x="0" y="0"/>
+          <a:ext cx="0" cy="0"/>
+          <a:chOff x="0" y="0"/>
+          <a:chExt cx="0" cy="0"/>
+        </a:xfrm>
+      </p:grpSpPr>
+      <p:pic>
+        <p:nvPicPr>
+          <p:cNvPr id="3" name="Picture 2" descr="A screen shot of a graph&#10;&#10;AI-generated content may be incorrect.">
+            <a:extLst>
+              <a:ext uri="{FF2B5EF4-FFF2-40B4-BE49-F238E27FC236}">
+                <a16:creationId xmlns:a16="http://schemas.microsoft.com/office/drawing/2014/main" id="{A7F9EF27-C22D-C6DC-84D4-8CC7B307423A}"/>
+              </a:ext>
+            </a:extLst>
+          </p:cNvPr>
+          <p:cNvPicPr>
+            <a:picLocks noChangeAspect="1"/>
+          </p:cNvPicPr>
+          <p:nvPr/>
+        </p:nvPicPr>
+        <p:blipFill>
+          <a:blip r:embed="rId2">
+            <a:extLst>
+              <a:ext uri="{28A0092B-C50C-407E-A947-70E740481C1C}">
+                <a14:useLocalDpi xmlns:a14="http://schemas.microsoft.com/office/drawing/2010/main" val="0"/>
+              </a:ext>
+            </a:extLst>
+          </a:blip>
+          <a:srcRect l="22540" t="32381" r="25352" b="28504"/>
+          <a:stretch/>
+        </p:blipFill>
+        <p:spPr>
+          <a:xfrm>
+            <a:off x="7221092" y="1575754"/>
+            <a:ext cx="2926080" cy="2196469"/>
+          </a:xfrm>
+          <a:prstGeom prst="rect">
+            <a:avLst/>
+          </a:prstGeom>
+        </p:spPr>
+      </p:pic>
+      <p:pic>
+        <p:nvPicPr>
+          <p:cNvPr id="6" name="Picture 5" descr="A screen shot of a graph&#10;&#10;AI-generated content may be incorrect.">
+            <a:extLst>
+              <a:ext uri="{FF2B5EF4-FFF2-40B4-BE49-F238E27FC236}">
+                <a16:creationId xmlns:a16="http://schemas.microsoft.com/office/drawing/2014/main" id="{E2D64D96-F821-FC32-F8E1-4B9A6E7713BD}"/>
+              </a:ext>
+            </a:extLst>
+          </p:cNvPr>
+          <p:cNvPicPr>
+            <a:picLocks noChangeAspect="1"/>
+          </p:cNvPicPr>
+          <p:nvPr/>
+        </p:nvPicPr>
+        <p:blipFill>
+          <a:blip r:embed="rId3">
+            <a:extLst>
+              <a:ext uri="{28A0092B-C50C-407E-A947-70E740481C1C}">
+                <a14:useLocalDpi xmlns:a14="http://schemas.microsoft.com/office/drawing/2010/main" val="0"/>
+              </a:ext>
+            </a:extLst>
+          </a:blip>
+          <a:srcRect l="22539" t="32381" r="25352" b="28504"/>
+          <a:stretch/>
+        </p:blipFill>
+        <p:spPr>
+          <a:xfrm>
+            <a:off x="7221092" y="3978115"/>
+            <a:ext cx="2926080" cy="2196469"/>
+          </a:xfrm>
+          <a:prstGeom prst="rect">
+            <a:avLst/>
+          </a:prstGeom>
+        </p:spPr>
+      </p:pic>
+      <p:sp>
+        <p:nvSpPr>
+          <p:cNvPr id="12" name="Rectangle: Rounded Corners 11">
+            <a:extLst>
+              <a:ext uri="{FF2B5EF4-FFF2-40B4-BE49-F238E27FC236}">
+                <a16:creationId xmlns:a16="http://schemas.microsoft.com/office/drawing/2014/main" id="{E87DA52A-383C-8B9B-B82C-87FE813E3312}"/>
+              </a:ext>
+            </a:extLst>
+          </p:cNvPr>
+          <p:cNvSpPr/>
+          <p:nvPr/>
+        </p:nvSpPr>
+        <p:spPr>
+          <a:xfrm>
+            <a:off x="5849492" y="1274910"/>
+            <a:ext cx="1371600" cy="685800"/>
+          </a:xfrm>
+          <a:prstGeom prst="roundRect">
+            <a:avLst/>
+          </a:prstGeom>
+          <a:solidFill>
+            <a:schemeClr val="tx2">
+              <a:lumMod val="75000"/>
+              <a:lumOff val="25000"/>
+              <a:alpha val="60000"/>
+            </a:schemeClr>
+          </a:solidFill>
+          <a:ln>
+            <a:noFill/>
+          </a:ln>
+        </p:spPr>
+        <p:style>
+          <a:lnRef idx="2">
+            <a:schemeClr val="accent1">
+              <a:shade val="15000"/>
+            </a:schemeClr>
+          </a:lnRef>
+          <a:fillRef idx="1">
+            <a:schemeClr val="accent1"/>
+          </a:fillRef>
+          <a:effectRef idx="0">
+            <a:schemeClr val="accent1"/>
+          </a:effectRef>
+          <a:fontRef idx="minor">
+            <a:schemeClr val="lt1"/>
+          </a:fontRef>
+        </p:style>
+        <p:txBody>
+          <a:bodyPr rtlCol="0" anchor="ctr"/>
+          <a:lstStyle/>
+          <a:p>
+            <a:pPr algn="ctr"/>
+            <a:r>
+              <a:rPr lang="en-US" sz="1600" dirty="0">
+                <a:solidFill>
+                  <a:sysClr val="windowText" lastClr="000000"/>
+                </a:solidFill>
+                <a:latin typeface="Times New Roman" panose="02020603050405020304" pitchFamily="18" charset="0"/>
+                <a:cs typeface="Times New Roman" panose="02020603050405020304" pitchFamily="18" charset="0"/>
+              </a:rPr>
+              <a:t>Alignment-based grid creation</a:t>
+            </a:r>
+          </a:p>
+        </p:txBody>
+      </p:sp>
+      <p:sp>
+        <p:nvSpPr>
+          <p:cNvPr id="14" name="Rectangle: Rounded Corners 13">
+            <a:extLst>
+              <a:ext uri="{FF2B5EF4-FFF2-40B4-BE49-F238E27FC236}">
+                <a16:creationId xmlns:a16="http://schemas.microsoft.com/office/drawing/2014/main" id="{CEF72FD5-5AB9-E596-B3BE-2BD63148F071}"/>
+              </a:ext>
+            </a:extLst>
+          </p:cNvPr>
+          <p:cNvSpPr/>
+          <p:nvPr/>
+        </p:nvSpPr>
+        <p:spPr>
+          <a:xfrm>
+            <a:off x="5849492" y="3774443"/>
+            <a:ext cx="1371600" cy="685800"/>
+          </a:xfrm>
+          <a:prstGeom prst="roundRect">
+            <a:avLst/>
+          </a:prstGeom>
+          <a:solidFill>
+            <a:schemeClr val="accent2">
+              <a:lumMod val="75000"/>
+              <a:alpha val="60000"/>
+            </a:schemeClr>
+          </a:solidFill>
+          <a:ln>
+            <a:noFill/>
+          </a:ln>
+        </p:spPr>
+        <p:style>
+          <a:lnRef idx="2">
+            <a:schemeClr val="accent1">
+              <a:shade val="15000"/>
+            </a:schemeClr>
+          </a:lnRef>
+          <a:fillRef idx="1">
+            <a:schemeClr val="accent1"/>
+          </a:fillRef>
+          <a:effectRef idx="0">
+            <a:schemeClr val="accent1"/>
+          </a:effectRef>
+          <a:fontRef idx="minor">
+            <a:schemeClr val="lt1"/>
+          </a:fontRef>
+        </p:style>
+        <p:txBody>
+          <a:bodyPr rtlCol="0" anchor="ctr"/>
+          <a:lstStyle/>
+          <a:p>
+            <a:pPr algn="ctr"/>
+            <a:r>
+              <a:rPr lang="en-US" sz="1600" dirty="0">
+                <a:solidFill>
+                  <a:sysClr val="windowText" lastClr="000000"/>
+                </a:solidFill>
+                <a:latin typeface="Times New Roman" panose="02020603050405020304" pitchFamily="18" charset="0"/>
+                <a:cs typeface="Times New Roman" panose="02020603050405020304" pitchFamily="18" charset="0"/>
+              </a:rPr>
+              <a:t>Multi-level grid merging</a:t>
+            </a:r>
+          </a:p>
+        </p:txBody>
+      </p:sp>
+      <p:sp>
+        <p:nvSpPr>
+          <p:cNvPr id="16" name="TextBox 15">
+            <a:extLst>
+              <a:ext uri="{FF2B5EF4-FFF2-40B4-BE49-F238E27FC236}">
+                <a16:creationId xmlns:a16="http://schemas.microsoft.com/office/drawing/2014/main" id="{AA4263DB-4535-EECA-8446-58B1ECD3325A}"/>
+              </a:ext>
+            </a:extLst>
+          </p:cNvPr>
+          <p:cNvSpPr txBox="1"/>
+          <p:nvPr/>
+        </p:nvSpPr>
+        <p:spPr>
+          <a:xfrm>
+            <a:off x="1360851" y="1283210"/>
+            <a:ext cx="4315670" cy="338554"/>
+          </a:xfrm>
+          <a:prstGeom prst="rect">
+            <a:avLst/>
+          </a:prstGeom>
+          <a:noFill/>
+        </p:spPr>
+        <p:txBody>
+          <a:bodyPr wrap="none" rtlCol="0">
+            <a:spAutoFit/>
+          </a:bodyPr>
+          <a:lstStyle/>
+          <a:p>
+            <a:pPr algn="ctr"/>
+            <a:r>
+              <a:rPr lang="en-US" sz="1600" b="1" dirty="0">
+                <a:latin typeface="Times New Roman" panose="02020603050405020304" pitchFamily="18" charset="0"/>
+                <a:cs typeface="Times New Roman" panose="02020603050405020304" pitchFamily="18" charset="0"/>
+              </a:rPr>
+              <a:t>The specified thresholds for exemplified results</a:t>
+            </a:r>
+          </a:p>
+        </p:txBody>
+      </p:sp>
+      <p:sp>
+        <p:nvSpPr>
+          <p:cNvPr id="24" name="TextBox 23">
+            <a:extLst>
+              <a:ext uri="{FF2B5EF4-FFF2-40B4-BE49-F238E27FC236}">
+                <a16:creationId xmlns:a16="http://schemas.microsoft.com/office/drawing/2014/main" id="{7DE43C46-E649-936D-BC32-91EFD12BE7AE}"/>
+              </a:ext>
+            </a:extLst>
+          </p:cNvPr>
+          <p:cNvSpPr txBox="1"/>
+          <p:nvPr/>
+        </p:nvSpPr>
+        <p:spPr>
+          <a:xfrm>
+            <a:off x="2233173" y="2802113"/>
+            <a:ext cx="2571025" cy="338554"/>
+          </a:xfrm>
+          <a:prstGeom prst="rect">
+            <a:avLst/>
+          </a:prstGeom>
+          <a:noFill/>
+        </p:spPr>
+        <p:txBody>
+          <a:bodyPr wrap="none" rtlCol="0">
+            <a:spAutoFit/>
+          </a:bodyPr>
+          <a:lstStyle/>
+          <a:p>
+            <a:pPr algn="ctr"/>
+            <a:r>
+              <a:rPr lang="en-US" sz="1600" b="1" dirty="0">
+                <a:latin typeface="Times New Roman" panose="02020603050405020304" pitchFamily="18" charset="0"/>
+                <a:cs typeface="Times New Roman" panose="02020603050405020304" pitchFamily="18" charset="0"/>
+              </a:rPr>
+              <a:t>2D view of the ground level</a:t>
+            </a:r>
+          </a:p>
+        </p:txBody>
+      </p:sp>
+      <p:pic>
+        <p:nvPicPr>
+          <p:cNvPr id="26" name="Picture 25">
+            <a:extLst>
+              <a:ext uri="{FF2B5EF4-FFF2-40B4-BE49-F238E27FC236}">
+                <a16:creationId xmlns:a16="http://schemas.microsoft.com/office/drawing/2014/main" id="{9C59FE99-FAE5-684A-87C4-038122F1396D}"/>
+              </a:ext>
+            </a:extLst>
+          </p:cNvPr>
+          <p:cNvPicPr>
+            <a:picLocks noChangeAspect="1"/>
+          </p:cNvPicPr>
+          <p:nvPr/>
+        </p:nvPicPr>
+        <p:blipFill>
+          <a:blip r:embed="rId4"/>
+          <a:srcRect t="3666" r="416"/>
+          <a:stretch/>
+        </p:blipFill>
+        <p:spPr>
+          <a:xfrm>
+            <a:off x="1232685" y="1941312"/>
+            <a:ext cx="4572000" cy="605691"/>
+          </a:xfrm>
+          <a:prstGeom prst="rect">
+            <a:avLst/>
+          </a:prstGeom>
+        </p:spPr>
+      </p:pic>
+      <p:pic>
+        <p:nvPicPr>
+          <p:cNvPr id="27" name="Picture 26" descr="A blueprint of a house&#10;&#10;AI-generated content may be incorrect.">
+            <a:extLst>
+              <a:ext uri="{FF2B5EF4-FFF2-40B4-BE49-F238E27FC236}">
+                <a16:creationId xmlns:a16="http://schemas.microsoft.com/office/drawing/2014/main" id="{E8D03E0A-D0BD-CBB9-8E44-4B30C7889700}"/>
+              </a:ext>
+            </a:extLst>
+          </p:cNvPr>
+          <p:cNvPicPr>
+            <a:picLocks noChangeAspect="1"/>
+          </p:cNvPicPr>
+          <p:nvPr/>
+        </p:nvPicPr>
+        <p:blipFill>
+          <a:blip r:embed="rId5">
+            <a:extLst>
+              <a:ext uri="{28A0092B-C50C-407E-A947-70E740481C1C}">
+                <a14:useLocalDpi xmlns:a14="http://schemas.microsoft.com/office/drawing/2010/main" val="0"/>
+              </a:ext>
+            </a:extLst>
+          </a:blip>
+          <a:stretch>
+            <a:fillRect/>
+          </a:stretch>
+        </p:blipFill>
+        <p:spPr>
+          <a:xfrm>
+            <a:off x="1232685" y="3081378"/>
+            <a:ext cx="4572000" cy="3271900"/>
+          </a:xfrm>
+          <a:prstGeom prst="rect">
+            <a:avLst/>
+          </a:prstGeom>
+        </p:spPr>
+      </p:pic>
+      <p:sp>
+        <p:nvSpPr>
+          <p:cNvPr id="28" name="TextBox 27">
+            <a:extLst>
+              <a:ext uri="{FF2B5EF4-FFF2-40B4-BE49-F238E27FC236}">
+                <a16:creationId xmlns:a16="http://schemas.microsoft.com/office/drawing/2014/main" id="{D426F834-62DB-EA1D-A3C8-AF378FE60DAD}"/>
+              </a:ext>
+            </a:extLst>
+          </p:cNvPr>
+          <p:cNvSpPr txBox="1"/>
+          <p:nvPr/>
+        </p:nvSpPr>
+        <p:spPr>
+          <a:xfrm>
+            <a:off x="0" y="0"/>
+            <a:ext cx="1621213" cy="369332"/>
+          </a:xfrm>
+          <a:prstGeom prst="rect">
+            <a:avLst/>
+          </a:prstGeom>
+          <a:noFill/>
+        </p:spPr>
+        <p:txBody>
+          <a:bodyPr wrap="none" rtlCol="0">
+            <a:spAutoFit/>
+          </a:bodyPr>
+          <a:lstStyle/>
+          <a:p>
+            <a:r>
+              <a:rPr lang="en-US" b="1" dirty="0"/>
+              <a:t>Figure 8 (new)</a:t>
+            </a:r>
+          </a:p>
+        </p:txBody>
+      </p:sp>
+      <p:pic>
+        <p:nvPicPr>
+          <p:cNvPr id="29" name="Picture 28" descr="A screen shot of a graph&#10;&#10;AI-generated content may be incorrect.">
+            <a:extLst>
+              <a:ext uri="{FF2B5EF4-FFF2-40B4-BE49-F238E27FC236}">
+                <a16:creationId xmlns:a16="http://schemas.microsoft.com/office/drawing/2014/main" id="{9DADA23A-B704-14C7-1C9C-06207B94176E}"/>
+              </a:ext>
+            </a:extLst>
+          </p:cNvPr>
+          <p:cNvPicPr>
+            <a:picLocks noChangeAspect="1"/>
+          </p:cNvPicPr>
+          <p:nvPr/>
+        </p:nvPicPr>
+        <p:blipFill>
+          <a:blip r:embed="rId2">
+            <a:extLst>
+              <a:ext uri="{28A0092B-C50C-407E-A947-70E740481C1C}">
+                <a14:useLocalDpi xmlns:a14="http://schemas.microsoft.com/office/drawing/2010/main" val="0"/>
+              </a:ext>
+            </a:extLst>
+          </a:blip>
+          <a:srcRect l="5750" t="4721" r="58311" b="91798"/>
+          <a:stretch/>
+        </p:blipFill>
+        <p:spPr>
+          <a:xfrm rot="5400000">
+            <a:off x="9222887" y="3657923"/>
+            <a:ext cx="2359988" cy="228600"/>
+          </a:xfrm>
+          <a:prstGeom prst="rect">
+            <a:avLst/>
+          </a:prstGeom>
+        </p:spPr>
+      </p:pic>
+      <p:pic>
+        <p:nvPicPr>
+          <p:cNvPr id="30" name="Picture 29" descr="A screen shot of a graph&#10;&#10;AI-generated content may be incorrect.">
+            <a:extLst>
+              <a:ext uri="{FF2B5EF4-FFF2-40B4-BE49-F238E27FC236}">
+                <a16:creationId xmlns:a16="http://schemas.microsoft.com/office/drawing/2014/main" id="{885273AD-A4A1-7D28-24AF-788C2D0AB74F}"/>
+              </a:ext>
+            </a:extLst>
+          </p:cNvPr>
+          <p:cNvPicPr>
+            <a:picLocks noChangeAspect="1"/>
+          </p:cNvPicPr>
+          <p:nvPr/>
+        </p:nvPicPr>
+        <p:blipFill>
+          <a:blip r:embed="rId3">
+            <a:extLst>
+              <a:ext uri="{28A0092B-C50C-407E-A947-70E740481C1C}">
+                <a14:useLocalDpi xmlns:a14="http://schemas.microsoft.com/office/drawing/2010/main" val="0"/>
+              </a:ext>
+            </a:extLst>
+          </a:blip>
+          <a:srcRect l="61365" t="4859" r="27944" b="91660"/>
+          <a:stretch/>
+        </p:blipFill>
+        <p:spPr>
+          <a:xfrm>
+            <a:off x="8333128" y="6124678"/>
+            <a:ext cx="702008" cy="228600"/>
+          </a:xfrm>
+          <a:prstGeom prst="rect">
+            <a:avLst/>
+          </a:prstGeom>
+        </p:spPr>
+      </p:pic>
+      <p:pic>
+        <p:nvPicPr>
+          <p:cNvPr id="31" name="Picture 30" descr="A screen shot of a graph&#10;&#10;AI-generated content may be incorrect.">
+            <a:extLst>
+              <a:ext uri="{FF2B5EF4-FFF2-40B4-BE49-F238E27FC236}">
+                <a16:creationId xmlns:a16="http://schemas.microsoft.com/office/drawing/2014/main" id="{96DA9854-9CFC-64C2-2E47-72CB6BFA230A}"/>
+              </a:ext>
+            </a:extLst>
+          </p:cNvPr>
+          <p:cNvPicPr>
+            <a:picLocks noChangeAspect="1"/>
+          </p:cNvPicPr>
+          <p:nvPr/>
+        </p:nvPicPr>
+        <p:blipFill>
+          <a:blip r:embed="rId2">
+            <a:extLst>
+              <a:ext uri="{28A0092B-C50C-407E-A947-70E740481C1C}">
+                <a14:useLocalDpi xmlns:a14="http://schemas.microsoft.com/office/drawing/2010/main" val="0"/>
+              </a:ext>
+            </a:extLst>
+          </a:blip>
+          <a:srcRect l="41813" t="4843" r="8792" b="91676"/>
+          <a:stretch/>
+        </p:blipFill>
+        <p:spPr>
+          <a:xfrm>
+            <a:off x="7234026" y="1300794"/>
+            <a:ext cx="3243589" cy="228600"/>
+          </a:xfrm>
+          <a:prstGeom prst="rect">
+            <a:avLst/>
+          </a:prstGeom>
+        </p:spPr>
+      </p:pic>
+      <p:cxnSp>
+        <p:nvCxnSpPr>
+          <p:cNvPr id="35" name="Connector: Elbow 34">
+            <a:extLst>
+              <a:ext uri="{FF2B5EF4-FFF2-40B4-BE49-F238E27FC236}">
+                <a16:creationId xmlns:a16="http://schemas.microsoft.com/office/drawing/2014/main" id="{F45C696D-276A-DDB0-B8BC-47A04BC7CFCE}"/>
+              </a:ext>
+            </a:extLst>
+          </p:cNvPr>
+          <p:cNvCxnSpPr>
+            <a:stCxn id="26" idx="0"/>
+            <a:endCxn id="12" idx="1"/>
+          </p:cNvCxnSpPr>
+          <p:nvPr/>
+        </p:nvCxnSpPr>
+        <p:spPr>
+          <a:xfrm rot="5400000" flipH="1" flipV="1">
+            <a:off x="4522337" y="614158"/>
+            <a:ext cx="323502" cy="2330807"/>
+          </a:xfrm>
+          <a:prstGeom prst="bentConnector2">
+            <a:avLst/>
+          </a:prstGeom>
+          <a:ln w="12700">
+            <a:tailEnd type="triangle"/>
+          </a:ln>
+        </p:spPr>
+        <p:style>
+          <a:lnRef idx="2">
+            <a:schemeClr val="dk1"/>
+          </a:lnRef>
+          <a:fillRef idx="0">
+            <a:schemeClr val="dk1"/>
+          </a:fillRef>
+          <a:effectRef idx="1">
+            <a:schemeClr val="dk1"/>
+          </a:effectRef>
+          <a:fontRef idx="minor">
+            <a:schemeClr val="tx1"/>
+          </a:fontRef>
+        </p:style>
+      </p:cxnSp>
+      <p:cxnSp>
+        <p:nvCxnSpPr>
+          <p:cNvPr id="36" name="Connector: Elbow 35">
+            <a:extLst>
+              <a:ext uri="{FF2B5EF4-FFF2-40B4-BE49-F238E27FC236}">
+                <a16:creationId xmlns:a16="http://schemas.microsoft.com/office/drawing/2014/main" id="{CF50C99A-E618-7D60-BFB1-1399084D33CD}"/>
+              </a:ext>
+            </a:extLst>
+          </p:cNvPr>
+          <p:cNvCxnSpPr>
+            <a:cxnSpLocks/>
+            <a:stCxn id="26" idx="2"/>
+            <a:endCxn id="14" idx="0"/>
+          </p:cNvCxnSpPr>
+          <p:nvPr/>
+        </p:nvCxnSpPr>
+        <p:spPr>
+          <a:xfrm rot="16200000" flipH="1">
+            <a:off x="4413268" y="1652419"/>
+            <a:ext cx="1227440" cy="3016607"/>
+          </a:xfrm>
+          <a:prstGeom prst="bentConnector3">
+            <a:avLst>
+              <a:gd name="adj1" fmla="val 13461"/>
+            </a:avLst>
+          </a:prstGeom>
+          <a:ln w="12700">
+            <a:tailEnd type="triangle"/>
+          </a:ln>
+        </p:spPr>
+        <p:style>
+          <a:lnRef idx="2">
+            <a:schemeClr val="dk1"/>
+          </a:lnRef>
+          <a:fillRef idx="0">
+            <a:schemeClr val="dk1"/>
+          </a:fillRef>
+          <a:effectRef idx="1">
+            <a:schemeClr val="dk1"/>
+          </a:effectRef>
+          <a:fontRef idx="minor">
+            <a:schemeClr val="tx1"/>
+          </a:fontRef>
+        </p:style>
+      </p:cxnSp>
+      <p:cxnSp>
+        <p:nvCxnSpPr>
+          <p:cNvPr id="40" name="Straight Arrow Connector 39">
+            <a:extLst>
+              <a:ext uri="{FF2B5EF4-FFF2-40B4-BE49-F238E27FC236}">
+                <a16:creationId xmlns:a16="http://schemas.microsoft.com/office/drawing/2014/main" id="{EB54FBC0-3EC8-C906-953D-C252D7846D8E}"/>
+              </a:ext>
+            </a:extLst>
+          </p:cNvPr>
+          <p:cNvCxnSpPr>
+            <a:stCxn id="12" idx="2"/>
+            <a:endCxn id="14" idx="0"/>
+          </p:cNvCxnSpPr>
+          <p:nvPr/>
+        </p:nvCxnSpPr>
+        <p:spPr>
+          <a:xfrm>
+            <a:off x="6535292" y="1960710"/>
+            <a:ext cx="0" cy="1813733"/>
+          </a:xfrm>
+          <a:prstGeom prst="straightConnector1">
+            <a:avLst/>
+          </a:prstGeom>
+          <a:ln w="12700">
+            <a:tailEnd type="triangle"/>
+          </a:ln>
+        </p:spPr>
+        <p:style>
+          <a:lnRef idx="2">
+            <a:schemeClr val="dk1"/>
+          </a:lnRef>
+          <a:fillRef idx="0">
+            <a:schemeClr val="dk1"/>
+          </a:fillRef>
+          <a:effectRef idx="1">
+            <a:schemeClr val="dk1"/>
+          </a:effectRef>
+          <a:fontRef idx="minor">
+            <a:schemeClr val="tx1"/>
+          </a:fontRef>
+        </p:style>
+      </p:cxnSp>
+    </p:spTree>
+    <p:extLst>
+      <p:ext uri="{BB962C8B-B14F-4D97-AF65-F5344CB8AC3E}">
+        <p14:creationId xmlns:p14="http://schemas.microsoft.com/office/powerpoint/2010/main" val="2050572406"/>
+      </p:ext>
+    </p:extLst>
+  </p:cSld>
+  <p:clrMapOvr>
+    <a:masterClrMapping/>
+  </p:clrMapOvr>
+</p:sld>
+</file>
+
+<file path=ppt/slides/slide2.xml><?xml version="1.0" encoding="utf-8"?>
+<p:sld xmlns:a="http://schemas.openxmlformats.org/drawingml/2006/main" xmlns:r="http://schemas.openxmlformats.org/officeDocument/2006/relationships" xmlns:p="http://schemas.openxmlformats.org/presentationml/2006/main">
+  <p:cSld>
+    <p:spTree>
+      <p:nvGrpSpPr>
+        <p:cNvPr id="1" name="">
+          <a:extLst>
+            <a:ext uri="{FF2B5EF4-FFF2-40B4-BE49-F238E27FC236}">
+              <a16:creationId xmlns:a16="http://schemas.microsoft.com/office/drawing/2014/main" id="{12265951-2CF1-E0D2-324B-ECCA37E372F9}"/>
+            </a:ext>
+          </a:extLst>
+        </p:cNvPr>
+        <p:cNvGrpSpPr/>
+        <p:nvPr/>
+      </p:nvGrpSpPr>
+      <p:grpSpPr>
+        <a:xfrm>
+          <a:off x="0" y="0"/>
+          <a:ext cx="0" cy="0"/>
+          <a:chOff x="0" y="0"/>
+          <a:chExt cx="0" cy="0"/>
+        </a:xfrm>
+      </p:grpSpPr>
+      <p:pic>
+        <p:nvPicPr>
+          <p:cNvPr id="3" name="Picture 2" descr="A screen shot of a graph&#10;&#10;AI-generated content may be incorrect.">
+            <a:extLst>
+              <a:ext uri="{FF2B5EF4-FFF2-40B4-BE49-F238E27FC236}">
+                <a16:creationId xmlns:a16="http://schemas.microsoft.com/office/drawing/2014/main" id="{2A54DC96-60D9-E103-F247-6CCD9E2696D7}"/>
+              </a:ext>
+            </a:extLst>
+          </p:cNvPr>
+          <p:cNvPicPr>
+            <a:picLocks noChangeAspect="1"/>
+          </p:cNvPicPr>
+          <p:nvPr/>
+        </p:nvPicPr>
+        <p:blipFill>
+          <a:blip r:embed="rId2"/>
+          <a:srcRect l="22265" t="33013" r="25012" b="29423"/>
+          <a:stretch/>
+        </p:blipFill>
+        <p:spPr>
+          <a:xfrm>
+            <a:off x="1781657" y="1329435"/>
+            <a:ext cx="2823525" cy="2011680"/>
+          </a:xfrm>
+          <a:prstGeom prst="rect">
+            <a:avLst/>
+          </a:prstGeom>
+        </p:spPr>
+      </p:pic>
+      <p:sp>
+        <p:nvSpPr>
+          <p:cNvPr id="28" name="TextBox 27">
+            <a:extLst>
+              <a:ext uri="{FF2B5EF4-FFF2-40B4-BE49-F238E27FC236}">
+                <a16:creationId xmlns:a16="http://schemas.microsoft.com/office/drawing/2014/main" id="{9D70E087-C250-036D-5BFC-1EF063173785}"/>
+              </a:ext>
+            </a:extLst>
+          </p:cNvPr>
+          <p:cNvSpPr txBox="1"/>
+          <p:nvPr/>
+        </p:nvSpPr>
+        <p:spPr>
+          <a:xfrm>
+            <a:off x="0" y="0"/>
+            <a:ext cx="1621213" cy="369332"/>
+          </a:xfrm>
+          <a:prstGeom prst="rect">
+            <a:avLst/>
+          </a:prstGeom>
+          <a:noFill/>
+        </p:spPr>
+        <p:txBody>
+          <a:bodyPr wrap="none" rtlCol="0">
+            <a:spAutoFit/>
+          </a:bodyPr>
+          <a:lstStyle/>
+          <a:p>
+            <a:r>
+              <a:rPr lang="en-US" b="1" dirty="0"/>
+              <a:t>Figure 9 (new)</a:t>
+            </a:r>
+          </a:p>
+        </p:txBody>
+      </p:sp>
+      <p:pic>
+        <p:nvPicPr>
+          <p:cNvPr id="5" name="Picture 4" descr="A screen shot of a graph&#10;&#10;AI-generated content may be incorrect.">
+            <a:extLst>
+              <a:ext uri="{FF2B5EF4-FFF2-40B4-BE49-F238E27FC236}">
+                <a16:creationId xmlns:a16="http://schemas.microsoft.com/office/drawing/2014/main" id="{4D4BC5D0-CA69-2F59-E841-CA166DBD8ED9}"/>
+              </a:ext>
+            </a:extLst>
+          </p:cNvPr>
+          <p:cNvPicPr>
+            <a:picLocks noChangeAspect="1"/>
+          </p:cNvPicPr>
+          <p:nvPr/>
+        </p:nvPicPr>
+        <p:blipFill>
+          <a:blip r:embed="rId2"/>
+          <a:srcRect l="19885" t="5567" r="22682" b="92039"/>
+          <a:stretch/>
+        </p:blipFill>
+        <p:spPr>
+          <a:xfrm>
+            <a:off x="3082385" y="907411"/>
+            <a:ext cx="5943600" cy="247714"/>
+          </a:xfrm>
+          <a:prstGeom prst="rect">
+            <a:avLst/>
+          </a:prstGeom>
+        </p:spPr>
+      </p:pic>
+      <p:sp>
+        <p:nvSpPr>
+          <p:cNvPr id="2" name="TextBox 1">
+            <a:extLst>
+              <a:ext uri="{FF2B5EF4-FFF2-40B4-BE49-F238E27FC236}">
+                <a16:creationId xmlns:a16="http://schemas.microsoft.com/office/drawing/2014/main" id="{F5B405CF-9A93-58BE-B164-3C53886871E9}"/>
+              </a:ext>
+            </a:extLst>
+          </p:cNvPr>
+          <p:cNvSpPr txBox="1"/>
+          <p:nvPr/>
+        </p:nvSpPr>
+        <p:spPr>
+          <a:xfrm>
+            <a:off x="3021737" y="3331503"/>
+            <a:ext cx="343364" cy="307777"/>
+          </a:xfrm>
+          <a:prstGeom prst="rect">
+            <a:avLst/>
+          </a:prstGeom>
+          <a:noFill/>
+        </p:spPr>
+        <p:txBody>
+          <a:bodyPr wrap="none" rtlCol="0">
+            <a:spAutoFit/>
+          </a:bodyPr>
+          <a:lstStyle/>
+          <a:p>
+            <a:r>
+              <a:rPr lang="en-US" sz="1400" dirty="0">
+                <a:latin typeface="Arial" panose="020B0604020202020204" pitchFamily="34" charset="0"/>
+                <a:cs typeface="Arial" panose="020B0604020202020204" pitchFamily="34" charset="0"/>
+              </a:rPr>
+              <a:t>a)</a:t>
+            </a:r>
+          </a:p>
+        </p:txBody>
+      </p:sp>
+      <p:sp>
+        <p:nvSpPr>
+          <p:cNvPr id="6" name="TextBox 5">
+            <a:extLst>
+              <a:ext uri="{FF2B5EF4-FFF2-40B4-BE49-F238E27FC236}">
+                <a16:creationId xmlns:a16="http://schemas.microsoft.com/office/drawing/2014/main" id="{AD64A6B1-FE59-9CB7-D125-34E885BFA033}"/>
+              </a:ext>
+            </a:extLst>
+          </p:cNvPr>
+          <p:cNvSpPr txBox="1"/>
+          <p:nvPr/>
+        </p:nvSpPr>
+        <p:spPr>
+          <a:xfrm>
+            <a:off x="3021737" y="5587824"/>
+            <a:ext cx="343364" cy="307777"/>
+          </a:xfrm>
+          <a:prstGeom prst="rect">
+            <a:avLst/>
+          </a:prstGeom>
+          <a:noFill/>
+        </p:spPr>
+        <p:txBody>
+          <a:bodyPr wrap="none" rtlCol="0">
+            <a:spAutoFit/>
+          </a:bodyPr>
+          <a:lstStyle/>
+          <a:p>
+            <a:r>
+              <a:rPr lang="en-US" sz="1400" dirty="0">
+                <a:latin typeface="Arial" panose="020B0604020202020204" pitchFamily="34" charset="0"/>
+                <a:cs typeface="Arial" panose="020B0604020202020204" pitchFamily="34" charset="0"/>
+              </a:rPr>
+              <a:t>d)</a:t>
+            </a:r>
+          </a:p>
+        </p:txBody>
+      </p:sp>
+      <p:sp>
+        <p:nvSpPr>
+          <p:cNvPr id="7" name="TextBox 6">
+            <a:extLst>
+              <a:ext uri="{FF2B5EF4-FFF2-40B4-BE49-F238E27FC236}">
+                <a16:creationId xmlns:a16="http://schemas.microsoft.com/office/drawing/2014/main" id="{4FCECF8C-AF83-63FA-B5E0-452EC78FA120}"/>
+              </a:ext>
+            </a:extLst>
+          </p:cNvPr>
+          <p:cNvSpPr txBox="1"/>
+          <p:nvPr/>
+        </p:nvSpPr>
+        <p:spPr>
+          <a:xfrm>
+            <a:off x="5882503" y="3331503"/>
+            <a:ext cx="343364" cy="307777"/>
+          </a:xfrm>
+          <a:prstGeom prst="rect">
+            <a:avLst/>
+          </a:prstGeom>
+          <a:noFill/>
+        </p:spPr>
+        <p:txBody>
+          <a:bodyPr wrap="none" rtlCol="0">
+            <a:spAutoFit/>
+          </a:bodyPr>
+          <a:lstStyle/>
+          <a:p>
+            <a:r>
+              <a:rPr lang="en-US" sz="1400" dirty="0">
+                <a:latin typeface="Arial" panose="020B0604020202020204" pitchFamily="34" charset="0"/>
+                <a:cs typeface="Arial" panose="020B0604020202020204" pitchFamily="34" charset="0"/>
+              </a:rPr>
+              <a:t>b)</a:t>
+            </a:r>
+          </a:p>
+        </p:txBody>
+      </p:sp>
+      <p:sp>
+        <p:nvSpPr>
+          <p:cNvPr id="8" name="TextBox 7">
+            <a:extLst>
+              <a:ext uri="{FF2B5EF4-FFF2-40B4-BE49-F238E27FC236}">
+                <a16:creationId xmlns:a16="http://schemas.microsoft.com/office/drawing/2014/main" id="{53209C7F-5C2B-D9C4-5124-1CB9E99A69D6}"/>
+              </a:ext>
+            </a:extLst>
+          </p:cNvPr>
+          <p:cNvSpPr txBox="1"/>
+          <p:nvPr/>
+        </p:nvSpPr>
+        <p:spPr>
+          <a:xfrm>
+            <a:off x="5882503" y="5587824"/>
+            <a:ext cx="343364" cy="307777"/>
+          </a:xfrm>
+          <a:prstGeom prst="rect">
+            <a:avLst/>
+          </a:prstGeom>
+          <a:noFill/>
+        </p:spPr>
+        <p:txBody>
+          <a:bodyPr wrap="none" rtlCol="0">
+            <a:spAutoFit/>
+          </a:bodyPr>
+          <a:lstStyle/>
+          <a:p>
+            <a:r>
+              <a:rPr lang="en-US" sz="1400" dirty="0">
+                <a:latin typeface="Arial" panose="020B0604020202020204" pitchFamily="34" charset="0"/>
+                <a:cs typeface="Arial" panose="020B0604020202020204" pitchFamily="34" charset="0"/>
+              </a:rPr>
+              <a:t>e)</a:t>
+            </a:r>
+          </a:p>
+        </p:txBody>
+      </p:sp>
+      <p:sp>
+        <p:nvSpPr>
+          <p:cNvPr id="9" name="TextBox 8">
+            <a:extLst>
+              <a:ext uri="{FF2B5EF4-FFF2-40B4-BE49-F238E27FC236}">
+                <a16:creationId xmlns:a16="http://schemas.microsoft.com/office/drawing/2014/main" id="{01801BE9-54CE-D973-8CF6-B1AE7644025D}"/>
+              </a:ext>
+            </a:extLst>
+          </p:cNvPr>
+          <p:cNvSpPr txBox="1"/>
+          <p:nvPr/>
+        </p:nvSpPr>
+        <p:spPr>
+          <a:xfrm>
+            <a:off x="8748077" y="3331503"/>
+            <a:ext cx="333746" cy="307777"/>
+          </a:xfrm>
+          <a:prstGeom prst="rect">
+            <a:avLst/>
+          </a:prstGeom>
+          <a:noFill/>
+        </p:spPr>
+        <p:txBody>
+          <a:bodyPr wrap="none" rtlCol="0">
+            <a:spAutoFit/>
+          </a:bodyPr>
+          <a:lstStyle/>
+          <a:p>
+            <a:r>
+              <a:rPr lang="en-US" sz="1400" dirty="0">
+                <a:latin typeface="Arial" panose="020B0604020202020204" pitchFamily="34" charset="0"/>
+                <a:cs typeface="Arial" panose="020B0604020202020204" pitchFamily="34" charset="0"/>
+              </a:rPr>
+              <a:t>c)</a:t>
+            </a:r>
+          </a:p>
+        </p:txBody>
+      </p:sp>
+      <p:sp>
+        <p:nvSpPr>
+          <p:cNvPr id="10" name="TextBox 9">
+            <a:extLst>
+              <a:ext uri="{FF2B5EF4-FFF2-40B4-BE49-F238E27FC236}">
+                <a16:creationId xmlns:a16="http://schemas.microsoft.com/office/drawing/2014/main" id="{0E98D215-F1F0-0E08-3E07-CD14A197E08A}"/>
+              </a:ext>
+            </a:extLst>
+          </p:cNvPr>
+          <p:cNvSpPr txBox="1"/>
+          <p:nvPr/>
+        </p:nvSpPr>
+        <p:spPr>
+          <a:xfrm>
+            <a:off x="8763306" y="5587824"/>
+            <a:ext cx="303288" cy="307777"/>
+          </a:xfrm>
+          <a:prstGeom prst="rect">
+            <a:avLst/>
+          </a:prstGeom>
+          <a:noFill/>
+        </p:spPr>
+        <p:txBody>
+          <a:bodyPr wrap="none" rtlCol="0">
+            <a:spAutoFit/>
+          </a:bodyPr>
+          <a:lstStyle/>
+          <a:p>
+            <a:r>
+              <a:rPr lang="en-US" sz="1400" dirty="0">
+                <a:latin typeface="Arial" panose="020B0604020202020204" pitchFamily="34" charset="0"/>
+                <a:cs typeface="Arial" panose="020B0604020202020204" pitchFamily="34" charset="0"/>
+              </a:rPr>
+              <a:t>f)</a:t>
+            </a:r>
+          </a:p>
+        </p:txBody>
+      </p:sp>
+      <p:pic>
+        <p:nvPicPr>
+          <p:cNvPr id="11" name="Picture 10" descr="A screen shot of a graph&#10;&#10;AI-generated content may be incorrect.">
+            <a:extLst>
+              <a:ext uri="{FF2B5EF4-FFF2-40B4-BE49-F238E27FC236}">
+                <a16:creationId xmlns:a16="http://schemas.microsoft.com/office/drawing/2014/main" id="{DD884C00-652F-57D0-3737-001225F33E96}"/>
+              </a:ext>
+            </a:extLst>
+          </p:cNvPr>
+          <p:cNvPicPr>
+            <a:picLocks noChangeAspect="1"/>
+          </p:cNvPicPr>
+          <p:nvPr/>
+        </p:nvPicPr>
+        <p:blipFill>
+          <a:blip r:embed="rId3"/>
+          <a:srcRect l="22265" t="33013" r="25012" b="29423"/>
+          <a:stretch/>
+        </p:blipFill>
+        <p:spPr>
+          <a:xfrm>
+            <a:off x="4642423" y="1329435"/>
+            <a:ext cx="2823525" cy="2011680"/>
+          </a:xfrm>
+          <a:prstGeom prst="rect">
+            <a:avLst/>
+          </a:prstGeom>
+        </p:spPr>
+      </p:pic>
+      <p:pic>
+        <p:nvPicPr>
+          <p:cNvPr id="12" name="Picture 11" descr="A graph of a diagram&#10;&#10;AI-generated content may be incorrect.">
+            <a:extLst>
+              <a:ext uri="{FF2B5EF4-FFF2-40B4-BE49-F238E27FC236}">
+                <a16:creationId xmlns:a16="http://schemas.microsoft.com/office/drawing/2014/main" id="{EC0A32D4-8DAF-8746-32AC-66BF36C04F27}"/>
+              </a:ext>
+            </a:extLst>
+          </p:cNvPr>
+          <p:cNvPicPr>
+            <a:picLocks noChangeAspect="1"/>
+          </p:cNvPicPr>
+          <p:nvPr/>
+        </p:nvPicPr>
+        <p:blipFill>
+          <a:blip r:embed="rId4"/>
+          <a:srcRect l="22265" t="33013" r="25012" b="29423"/>
+          <a:stretch/>
+        </p:blipFill>
+        <p:spPr>
+          <a:xfrm>
+            <a:off x="7503187" y="1329435"/>
+            <a:ext cx="2823526" cy="2011680"/>
+          </a:xfrm>
+          <a:prstGeom prst="rect">
+            <a:avLst/>
+          </a:prstGeom>
+        </p:spPr>
+      </p:pic>
+      <p:pic>
+        <p:nvPicPr>
+          <p:cNvPr id="13" name="Picture 12" descr="A screen shot of a graph&#10;&#10;AI-generated content may be incorrect.">
+            <a:extLst>
+              <a:ext uri="{FF2B5EF4-FFF2-40B4-BE49-F238E27FC236}">
+                <a16:creationId xmlns:a16="http://schemas.microsoft.com/office/drawing/2014/main" id="{CFA006A3-081B-5FFA-CF9A-B1CA78FDE7B8}"/>
+              </a:ext>
+            </a:extLst>
+          </p:cNvPr>
+          <p:cNvPicPr>
+            <a:picLocks noChangeAspect="1"/>
+          </p:cNvPicPr>
+          <p:nvPr/>
+        </p:nvPicPr>
+        <p:blipFill>
+          <a:blip r:embed="rId5"/>
+          <a:srcRect l="22265" t="33013" r="25012" b="29423"/>
+          <a:stretch/>
+        </p:blipFill>
+        <p:spPr>
+          <a:xfrm>
+            <a:off x="1781657" y="3585754"/>
+            <a:ext cx="2823525" cy="2011680"/>
+          </a:xfrm>
+          <a:prstGeom prst="rect">
+            <a:avLst/>
+          </a:prstGeom>
+        </p:spPr>
+      </p:pic>
+      <p:pic>
+        <p:nvPicPr>
+          <p:cNvPr id="14" name="Picture 13" descr="A screen shot of a graph&#10;&#10;AI-generated content may be incorrect.">
+            <a:extLst>
+              <a:ext uri="{FF2B5EF4-FFF2-40B4-BE49-F238E27FC236}">
+                <a16:creationId xmlns:a16="http://schemas.microsoft.com/office/drawing/2014/main" id="{A2DB6BDF-B4A5-2ED7-CC4D-AE1AE2E16C68}"/>
+              </a:ext>
+            </a:extLst>
+          </p:cNvPr>
+          <p:cNvPicPr>
+            <a:picLocks noChangeAspect="1"/>
+          </p:cNvPicPr>
+          <p:nvPr/>
+        </p:nvPicPr>
+        <p:blipFill>
+          <a:blip r:embed="rId6"/>
+          <a:srcRect l="22265" t="33012" r="25012" b="29424"/>
+          <a:stretch/>
+        </p:blipFill>
+        <p:spPr>
+          <a:xfrm>
+            <a:off x="4642422" y="3585754"/>
+            <a:ext cx="2823526" cy="2011680"/>
+          </a:xfrm>
+          <a:prstGeom prst="rect">
+            <a:avLst/>
+          </a:prstGeom>
+        </p:spPr>
+      </p:pic>
+      <p:pic>
+        <p:nvPicPr>
+          <p:cNvPr id="15" name="Picture 14" descr="A diagram of a building&#10;&#10;AI-generated content may be incorrect.">
+            <a:extLst>
+              <a:ext uri="{FF2B5EF4-FFF2-40B4-BE49-F238E27FC236}">
+                <a16:creationId xmlns:a16="http://schemas.microsoft.com/office/drawing/2014/main" id="{59369A43-352D-EDE3-D3CD-7314BA1E4093}"/>
+              </a:ext>
+            </a:extLst>
+          </p:cNvPr>
+          <p:cNvPicPr>
+            <a:picLocks noChangeAspect="1"/>
+          </p:cNvPicPr>
+          <p:nvPr/>
+        </p:nvPicPr>
+        <p:blipFill>
+          <a:blip r:embed="rId7"/>
+          <a:srcRect l="22265" t="33013" r="25012" b="29423"/>
+          <a:stretch/>
+        </p:blipFill>
+        <p:spPr>
+          <a:xfrm>
+            <a:off x="7503188" y="3585754"/>
+            <a:ext cx="2823525" cy="2011680"/>
+          </a:xfrm>
+          <a:prstGeom prst="rect">
+            <a:avLst/>
+          </a:prstGeom>
+        </p:spPr>
+      </p:pic>
+    </p:spTree>
+    <p:extLst>
+      <p:ext uri="{BB962C8B-B14F-4D97-AF65-F5344CB8AC3E}">
+        <p14:creationId xmlns:p14="http://schemas.microsoft.com/office/powerpoint/2010/main" val="3117462716"/>
+      </p:ext>
+    </p:extLst>
+  </p:cSld>
+  <p:clrMapOvr>
+    <a:masterClrMapping/>
+  </p:clrMapOvr>
+</p:sld>
+</file>
+
+<file path=ppt/slides/slide3.xml><?xml version="1.0" encoding="utf-8"?>
+<p:sld xmlns:a="http://schemas.openxmlformats.org/drawingml/2006/main" xmlns:r="http://schemas.openxmlformats.org/officeDocument/2006/relationships" xmlns:p="http://schemas.openxmlformats.org/presentationml/2006/main">
+  <p:cSld>
+    <p:spTree>
+      <p:nvGrpSpPr>
         <p:cNvPr id="1" name=""/>
         <p:cNvGrpSpPr/>
         <p:nvPr/>
@@ -3806,10 +4963,794 @@
           </a:p>
         </p:txBody>
       </p:sp>
+      <p:sp>
+        <p:nvSpPr>
+          <p:cNvPr id="2" name="TextBox 1">
+            <a:extLst>
+              <a:ext uri="{FF2B5EF4-FFF2-40B4-BE49-F238E27FC236}">
+                <a16:creationId xmlns:a16="http://schemas.microsoft.com/office/drawing/2014/main" id="{43CB3985-E5C8-F5D6-CCB3-9103AE13546E}"/>
+              </a:ext>
+            </a:extLst>
+          </p:cNvPr>
+          <p:cNvSpPr txBox="1"/>
+          <p:nvPr/>
+        </p:nvSpPr>
+        <p:spPr>
+          <a:xfrm>
+            <a:off x="0" y="0"/>
+            <a:ext cx="2091535" cy="369332"/>
+          </a:xfrm>
+          <a:prstGeom prst="rect">
+            <a:avLst/>
+          </a:prstGeom>
+          <a:noFill/>
+        </p:spPr>
+        <p:txBody>
+          <a:bodyPr wrap="none" rtlCol="0">
+            <a:spAutoFit/>
+          </a:bodyPr>
+          <a:lstStyle/>
+          <a:p>
+            <a:r>
+              <a:rPr lang="en-US" b="1" dirty="0"/>
+              <a:t>Figure 9 (previous)</a:t>
+            </a:r>
+          </a:p>
+        </p:txBody>
+      </p:sp>
     </p:spTree>
     <p:extLst>
       <p:ext uri="{BB962C8B-B14F-4D97-AF65-F5344CB8AC3E}">
         <p14:creationId xmlns:p14="http://schemas.microsoft.com/office/powerpoint/2010/main" val="3536024894"/>
+      </p:ext>
+    </p:extLst>
+  </p:cSld>
+  <p:clrMapOvr>
+    <a:masterClrMapping/>
+  </p:clrMapOvr>
+</p:sld>
+</file>
+
+<file path=ppt/slides/slide4.xml><?xml version="1.0" encoding="utf-8"?>
+<p:sld xmlns:a="http://schemas.openxmlformats.org/drawingml/2006/main" xmlns:r="http://schemas.openxmlformats.org/officeDocument/2006/relationships" xmlns:p="http://schemas.openxmlformats.org/presentationml/2006/main">
+  <p:cSld>
+    <p:spTree>
+      <p:nvGrpSpPr>
+        <p:cNvPr id="1" name="">
+          <a:extLst>
+            <a:ext uri="{FF2B5EF4-FFF2-40B4-BE49-F238E27FC236}">
+              <a16:creationId xmlns:a16="http://schemas.microsoft.com/office/drawing/2014/main" id="{020E559D-74FE-0B2C-EBD4-D9176D6BD9AC}"/>
+            </a:ext>
+          </a:extLst>
+        </p:cNvPr>
+        <p:cNvGrpSpPr/>
+        <p:nvPr/>
+      </p:nvGrpSpPr>
+      <p:grpSpPr>
+        <a:xfrm>
+          <a:off x="0" y="0"/>
+          <a:ext cx="0" cy="0"/>
+          <a:chOff x="0" y="0"/>
+          <a:chExt cx="0" cy="0"/>
+        </a:xfrm>
+      </p:grpSpPr>
+      <p:pic>
+        <p:nvPicPr>
+          <p:cNvPr id="3" name="Picture 2" descr="A screen shot of a graph&#10;&#10;AI-generated content may be incorrect.">
+            <a:extLst>
+              <a:ext uri="{FF2B5EF4-FFF2-40B4-BE49-F238E27FC236}">
+                <a16:creationId xmlns:a16="http://schemas.microsoft.com/office/drawing/2014/main" id="{310CE2A8-C401-672A-7D6D-5204971812E2}"/>
+              </a:ext>
+            </a:extLst>
+          </p:cNvPr>
+          <p:cNvPicPr>
+            <a:picLocks noChangeAspect="1"/>
+          </p:cNvPicPr>
+          <p:nvPr/>
+        </p:nvPicPr>
+        <p:blipFill>
+          <a:blip r:embed="rId2"/>
+          <a:srcRect l="22265" t="33013" r="25012" b="29423"/>
+          <a:stretch/>
+        </p:blipFill>
+        <p:spPr>
+          <a:xfrm>
+            <a:off x="4193930" y="2264018"/>
+            <a:ext cx="3615791" cy="2576147"/>
+          </a:xfrm>
+          <a:prstGeom prst="rect">
+            <a:avLst/>
+          </a:prstGeom>
+        </p:spPr>
+      </p:pic>
+      <p:sp>
+        <p:nvSpPr>
+          <p:cNvPr id="28" name="TextBox 27">
+            <a:extLst>
+              <a:ext uri="{FF2B5EF4-FFF2-40B4-BE49-F238E27FC236}">
+                <a16:creationId xmlns:a16="http://schemas.microsoft.com/office/drawing/2014/main" id="{0D7A78C4-1F15-DA8C-EAE5-88F2152ED096}"/>
+              </a:ext>
+            </a:extLst>
+          </p:cNvPr>
+          <p:cNvSpPr txBox="1"/>
+          <p:nvPr/>
+        </p:nvSpPr>
+        <p:spPr>
+          <a:xfrm>
+            <a:off x="0" y="0"/>
+            <a:ext cx="1621213" cy="369332"/>
+          </a:xfrm>
+          <a:prstGeom prst="rect">
+            <a:avLst/>
+          </a:prstGeom>
+          <a:noFill/>
+        </p:spPr>
+        <p:txBody>
+          <a:bodyPr wrap="none" rtlCol="0">
+            <a:spAutoFit/>
+          </a:bodyPr>
+          <a:lstStyle/>
+          <a:p>
+            <a:r>
+              <a:rPr lang="en-US" b="1" dirty="0"/>
+              <a:t>Figure 9 (new)</a:t>
+            </a:r>
+          </a:p>
+        </p:txBody>
+      </p:sp>
+      <p:sp>
+        <p:nvSpPr>
+          <p:cNvPr id="4" name="Rectangle 3">
+            <a:extLst>
+              <a:ext uri="{FF2B5EF4-FFF2-40B4-BE49-F238E27FC236}">
+                <a16:creationId xmlns:a16="http://schemas.microsoft.com/office/drawing/2014/main" id="{36713A1C-6CA5-682A-251F-156C09E5503F}"/>
+              </a:ext>
+            </a:extLst>
+          </p:cNvPr>
+          <p:cNvSpPr/>
+          <p:nvPr/>
+        </p:nvSpPr>
+        <p:spPr>
+          <a:xfrm>
+            <a:off x="4193930" y="2264019"/>
+            <a:ext cx="3615791" cy="2576146"/>
+          </a:xfrm>
+          <a:prstGeom prst="rect">
+            <a:avLst/>
+          </a:prstGeom>
+          <a:noFill/>
+          <a:ln>
+            <a:solidFill>
+              <a:schemeClr val="tx2">
+                <a:lumMod val="50000"/>
+                <a:lumOff val="50000"/>
+              </a:schemeClr>
+            </a:solidFill>
+          </a:ln>
+        </p:spPr>
+        <p:style>
+          <a:lnRef idx="2">
+            <a:schemeClr val="accent1">
+              <a:shade val="15000"/>
+            </a:schemeClr>
+          </a:lnRef>
+          <a:fillRef idx="1">
+            <a:schemeClr val="accent1"/>
+          </a:fillRef>
+          <a:effectRef idx="0">
+            <a:schemeClr val="accent1"/>
+          </a:effectRef>
+          <a:fontRef idx="minor">
+            <a:schemeClr val="lt1"/>
+          </a:fontRef>
+        </p:style>
+        <p:txBody>
+          <a:bodyPr rtlCol="0" anchor="ctr"/>
+          <a:lstStyle/>
+          <a:p>
+            <a:pPr algn="ctr"/>
+            <a:endParaRPr lang="en-US"/>
+          </a:p>
+        </p:txBody>
+      </p:sp>
+    </p:spTree>
+    <p:extLst>
+      <p:ext uri="{BB962C8B-B14F-4D97-AF65-F5344CB8AC3E}">
+        <p14:creationId xmlns:p14="http://schemas.microsoft.com/office/powerpoint/2010/main" val="4092628470"/>
+      </p:ext>
+    </p:extLst>
+  </p:cSld>
+  <p:clrMapOvr>
+    <a:masterClrMapping/>
+  </p:clrMapOvr>
+</p:sld>
+</file>
+
+<file path=ppt/slides/slide5.xml><?xml version="1.0" encoding="utf-8"?>
+<p:sld xmlns:a="http://schemas.openxmlformats.org/drawingml/2006/main" xmlns:r="http://schemas.openxmlformats.org/officeDocument/2006/relationships" xmlns:p="http://schemas.openxmlformats.org/presentationml/2006/main">
+  <p:cSld>
+    <p:spTree>
+      <p:nvGrpSpPr>
+        <p:cNvPr id="1" name=""/>
+        <p:cNvGrpSpPr/>
+        <p:nvPr/>
+      </p:nvGrpSpPr>
+      <p:grpSpPr>
+        <a:xfrm>
+          <a:off x="0" y="0"/>
+          <a:ext cx="0" cy="0"/>
+          <a:chOff x="0" y="0"/>
+          <a:chExt cx="0" cy="0"/>
+        </a:xfrm>
+      </p:grpSpPr>
+      <p:pic>
+        <p:nvPicPr>
+          <p:cNvPr id="6" name="Picture 5" descr="A screen shot of a graph&#10;&#10;AI-generated content may be incorrect.">
+            <a:extLst>
+              <a:ext uri="{FF2B5EF4-FFF2-40B4-BE49-F238E27FC236}">
+                <a16:creationId xmlns:a16="http://schemas.microsoft.com/office/drawing/2014/main" id="{06ACA060-E0B7-71CA-A19F-61A984D32159}"/>
+              </a:ext>
+            </a:extLst>
+          </p:cNvPr>
+          <p:cNvPicPr>
+            <a:picLocks noChangeAspect="1"/>
+          </p:cNvPicPr>
+          <p:nvPr/>
+        </p:nvPicPr>
+        <p:blipFill>
+          <a:blip r:embed="rId2"/>
+          <a:srcRect l="22265" t="33013" r="25012" b="29423"/>
+          <a:stretch/>
+        </p:blipFill>
+        <p:spPr>
+          <a:xfrm>
+            <a:off x="4193930" y="2264018"/>
+            <a:ext cx="3615791" cy="2576147"/>
+          </a:xfrm>
+          <a:prstGeom prst="rect">
+            <a:avLst/>
+          </a:prstGeom>
+        </p:spPr>
+      </p:pic>
+      <p:sp>
+        <p:nvSpPr>
+          <p:cNvPr id="4" name="Rectangle 3">
+            <a:extLst>
+              <a:ext uri="{FF2B5EF4-FFF2-40B4-BE49-F238E27FC236}">
+                <a16:creationId xmlns:a16="http://schemas.microsoft.com/office/drawing/2014/main" id="{8BE42938-D652-ED7C-AD15-F5B2FFEFBEE6}"/>
+              </a:ext>
+            </a:extLst>
+          </p:cNvPr>
+          <p:cNvSpPr/>
+          <p:nvPr/>
+        </p:nvSpPr>
+        <p:spPr>
+          <a:xfrm>
+            <a:off x="4193930" y="2264019"/>
+            <a:ext cx="3615791" cy="2576146"/>
+          </a:xfrm>
+          <a:prstGeom prst="rect">
+            <a:avLst/>
+          </a:prstGeom>
+          <a:noFill/>
+          <a:ln>
+            <a:solidFill>
+              <a:schemeClr val="tx2">
+                <a:lumMod val="50000"/>
+                <a:lumOff val="50000"/>
+              </a:schemeClr>
+            </a:solidFill>
+          </a:ln>
+        </p:spPr>
+        <p:style>
+          <a:lnRef idx="2">
+            <a:schemeClr val="accent1">
+              <a:shade val="15000"/>
+            </a:schemeClr>
+          </a:lnRef>
+          <a:fillRef idx="1">
+            <a:schemeClr val="accent1"/>
+          </a:fillRef>
+          <a:effectRef idx="0">
+            <a:schemeClr val="accent1"/>
+          </a:effectRef>
+          <a:fontRef idx="minor">
+            <a:schemeClr val="lt1"/>
+          </a:fontRef>
+        </p:style>
+        <p:txBody>
+          <a:bodyPr rtlCol="0" anchor="ctr"/>
+          <a:lstStyle/>
+          <a:p>
+            <a:pPr algn="ctr"/>
+            <a:endParaRPr lang="en-US"/>
+          </a:p>
+        </p:txBody>
+      </p:sp>
+    </p:spTree>
+    <p:extLst>
+      <p:ext uri="{BB962C8B-B14F-4D97-AF65-F5344CB8AC3E}">
+        <p14:creationId xmlns:p14="http://schemas.microsoft.com/office/powerpoint/2010/main" val="1795686067"/>
+      </p:ext>
+    </p:extLst>
+  </p:cSld>
+  <p:clrMapOvr>
+    <a:masterClrMapping/>
+  </p:clrMapOvr>
+</p:sld>
+</file>
+
+<file path=ppt/slides/slide6.xml><?xml version="1.0" encoding="utf-8"?>
+<p:sld xmlns:a="http://schemas.openxmlformats.org/drawingml/2006/main" xmlns:r="http://schemas.openxmlformats.org/officeDocument/2006/relationships" xmlns:p="http://schemas.openxmlformats.org/presentationml/2006/main">
+  <p:cSld>
+    <p:spTree>
+      <p:nvGrpSpPr>
+        <p:cNvPr id="1" name="">
+          <a:extLst>
+            <a:ext uri="{FF2B5EF4-FFF2-40B4-BE49-F238E27FC236}">
+              <a16:creationId xmlns:a16="http://schemas.microsoft.com/office/drawing/2014/main" id="{A9C216BD-0502-E5C2-D130-8FAD63BFD042}"/>
+            </a:ext>
+          </a:extLst>
+        </p:cNvPr>
+        <p:cNvGrpSpPr/>
+        <p:nvPr/>
+      </p:nvGrpSpPr>
+      <p:grpSpPr>
+        <a:xfrm>
+          <a:off x="0" y="0"/>
+          <a:ext cx="0" cy="0"/>
+          <a:chOff x="0" y="0"/>
+          <a:chExt cx="0" cy="0"/>
+        </a:xfrm>
+      </p:grpSpPr>
+      <p:pic>
+        <p:nvPicPr>
+          <p:cNvPr id="6" name="Picture 5" descr="A graph of a diagram&#10;&#10;AI-generated content may be incorrect.">
+            <a:extLst>
+              <a:ext uri="{FF2B5EF4-FFF2-40B4-BE49-F238E27FC236}">
+                <a16:creationId xmlns:a16="http://schemas.microsoft.com/office/drawing/2014/main" id="{998FC012-CCC7-8C7F-B43D-8D1DCB0381E7}"/>
+              </a:ext>
+            </a:extLst>
+          </p:cNvPr>
+          <p:cNvPicPr>
+            <a:picLocks noChangeAspect="1"/>
+          </p:cNvPicPr>
+          <p:nvPr/>
+        </p:nvPicPr>
+        <p:blipFill>
+          <a:blip r:embed="rId2"/>
+          <a:srcRect l="22265" t="33013" r="25012" b="29423"/>
+          <a:stretch/>
+        </p:blipFill>
+        <p:spPr>
+          <a:xfrm>
+            <a:off x="4193930" y="2264019"/>
+            <a:ext cx="3615791" cy="2576146"/>
+          </a:xfrm>
+          <a:prstGeom prst="rect">
+            <a:avLst/>
+          </a:prstGeom>
+        </p:spPr>
+      </p:pic>
+      <p:sp>
+        <p:nvSpPr>
+          <p:cNvPr id="4" name="Rectangle 3">
+            <a:extLst>
+              <a:ext uri="{FF2B5EF4-FFF2-40B4-BE49-F238E27FC236}">
+                <a16:creationId xmlns:a16="http://schemas.microsoft.com/office/drawing/2014/main" id="{35004C49-BC2B-8AB3-8CB7-F7C2BB1FD844}"/>
+              </a:ext>
+            </a:extLst>
+          </p:cNvPr>
+          <p:cNvSpPr/>
+          <p:nvPr/>
+        </p:nvSpPr>
+        <p:spPr>
+          <a:xfrm>
+            <a:off x="4193930" y="2264019"/>
+            <a:ext cx="3615791" cy="2576146"/>
+          </a:xfrm>
+          <a:prstGeom prst="rect">
+            <a:avLst/>
+          </a:prstGeom>
+          <a:noFill/>
+          <a:ln>
+            <a:solidFill>
+              <a:schemeClr val="tx2">
+                <a:lumMod val="50000"/>
+                <a:lumOff val="50000"/>
+              </a:schemeClr>
+            </a:solidFill>
+          </a:ln>
+        </p:spPr>
+        <p:style>
+          <a:lnRef idx="2">
+            <a:schemeClr val="accent1">
+              <a:shade val="15000"/>
+            </a:schemeClr>
+          </a:lnRef>
+          <a:fillRef idx="1">
+            <a:schemeClr val="accent1"/>
+          </a:fillRef>
+          <a:effectRef idx="0">
+            <a:schemeClr val="accent1"/>
+          </a:effectRef>
+          <a:fontRef idx="minor">
+            <a:schemeClr val="lt1"/>
+          </a:fontRef>
+        </p:style>
+        <p:txBody>
+          <a:bodyPr rtlCol="0" anchor="ctr"/>
+          <a:lstStyle/>
+          <a:p>
+            <a:pPr algn="ctr"/>
+            <a:endParaRPr lang="en-US"/>
+          </a:p>
+        </p:txBody>
+      </p:sp>
+    </p:spTree>
+    <p:extLst>
+      <p:ext uri="{BB962C8B-B14F-4D97-AF65-F5344CB8AC3E}">
+        <p14:creationId xmlns:p14="http://schemas.microsoft.com/office/powerpoint/2010/main" val="863826703"/>
+      </p:ext>
+    </p:extLst>
+  </p:cSld>
+  <p:clrMapOvr>
+    <a:masterClrMapping/>
+  </p:clrMapOvr>
+</p:sld>
+</file>
+
+<file path=ppt/slides/slide7.xml><?xml version="1.0" encoding="utf-8"?>
+<p:sld xmlns:a="http://schemas.openxmlformats.org/drawingml/2006/main" xmlns:r="http://schemas.openxmlformats.org/officeDocument/2006/relationships" xmlns:p="http://schemas.openxmlformats.org/presentationml/2006/main">
+  <p:cSld>
+    <p:spTree>
+      <p:nvGrpSpPr>
+        <p:cNvPr id="1" name="">
+          <a:extLst>
+            <a:ext uri="{FF2B5EF4-FFF2-40B4-BE49-F238E27FC236}">
+              <a16:creationId xmlns:a16="http://schemas.microsoft.com/office/drawing/2014/main" id="{BFC57DF4-BCF7-0637-5F76-F29FCB93E403}"/>
+            </a:ext>
+          </a:extLst>
+        </p:cNvPr>
+        <p:cNvGrpSpPr/>
+        <p:nvPr/>
+      </p:nvGrpSpPr>
+      <p:grpSpPr>
+        <a:xfrm>
+          <a:off x="0" y="0"/>
+          <a:ext cx="0" cy="0"/>
+          <a:chOff x="0" y="0"/>
+          <a:chExt cx="0" cy="0"/>
+        </a:xfrm>
+      </p:grpSpPr>
+      <p:pic>
+        <p:nvPicPr>
+          <p:cNvPr id="4" name="Picture 3" descr="A screen shot of a graph&#10;&#10;AI-generated content may be incorrect.">
+            <a:extLst>
+              <a:ext uri="{FF2B5EF4-FFF2-40B4-BE49-F238E27FC236}">
+                <a16:creationId xmlns:a16="http://schemas.microsoft.com/office/drawing/2014/main" id="{179FE113-B924-FE93-2423-B39AB14CFB94}"/>
+              </a:ext>
+            </a:extLst>
+          </p:cNvPr>
+          <p:cNvPicPr>
+            <a:picLocks noChangeAspect="1"/>
+          </p:cNvPicPr>
+          <p:nvPr/>
+        </p:nvPicPr>
+        <p:blipFill>
+          <a:blip r:embed="rId2"/>
+          <a:srcRect l="22265" t="33013" r="25012" b="29423"/>
+          <a:stretch/>
+        </p:blipFill>
+        <p:spPr>
+          <a:xfrm>
+            <a:off x="4193930" y="2264018"/>
+            <a:ext cx="3615791" cy="2576147"/>
+          </a:xfrm>
+          <a:prstGeom prst="rect">
+            <a:avLst/>
+          </a:prstGeom>
+        </p:spPr>
+      </p:pic>
+      <p:sp>
+        <p:nvSpPr>
+          <p:cNvPr id="2" name="Rectangle 1">
+            <a:extLst>
+              <a:ext uri="{FF2B5EF4-FFF2-40B4-BE49-F238E27FC236}">
+                <a16:creationId xmlns:a16="http://schemas.microsoft.com/office/drawing/2014/main" id="{4F2737B3-43C5-1FA7-7051-7639B7C5C667}"/>
+              </a:ext>
+            </a:extLst>
+          </p:cNvPr>
+          <p:cNvSpPr/>
+          <p:nvPr/>
+        </p:nvSpPr>
+        <p:spPr>
+          <a:xfrm>
+            <a:off x="4193930" y="2264019"/>
+            <a:ext cx="3615791" cy="2576146"/>
+          </a:xfrm>
+          <a:prstGeom prst="rect">
+            <a:avLst/>
+          </a:prstGeom>
+          <a:noFill/>
+          <a:ln>
+            <a:solidFill>
+              <a:schemeClr val="tx2">
+                <a:lumMod val="50000"/>
+                <a:lumOff val="50000"/>
+              </a:schemeClr>
+            </a:solidFill>
+          </a:ln>
+        </p:spPr>
+        <p:style>
+          <a:lnRef idx="2">
+            <a:schemeClr val="accent1">
+              <a:shade val="15000"/>
+            </a:schemeClr>
+          </a:lnRef>
+          <a:fillRef idx="1">
+            <a:schemeClr val="accent1"/>
+          </a:fillRef>
+          <a:effectRef idx="0">
+            <a:schemeClr val="accent1"/>
+          </a:effectRef>
+          <a:fontRef idx="minor">
+            <a:schemeClr val="lt1"/>
+          </a:fontRef>
+        </p:style>
+        <p:txBody>
+          <a:bodyPr rtlCol="0" anchor="ctr"/>
+          <a:lstStyle/>
+          <a:p>
+            <a:pPr algn="ctr"/>
+            <a:endParaRPr lang="en-US"/>
+          </a:p>
+        </p:txBody>
+      </p:sp>
+    </p:spTree>
+    <p:extLst>
+      <p:ext uri="{BB962C8B-B14F-4D97-AF65-F5344CB8AC3E}">
+        <p14:creationId xmlns:p14="http://schemas.microsoft.com/office/powerpoint/2010/main" val="4161374431"/>
+      </p:ext>
+    </p:extLst>
+  </p:cSld>
+  <p:clrMapOvr>
+    <a:masterClrMapping/>
+  </p:clrMapOvr>
+</p:sld>
+</file>
+
+<file path=ppt/slides/slide8.xml><?xml version="1.0" encoding="utf-8"?>
+<p:sld xmlns:a="http://schemas.openxmlformats.org/drawingml/2006/main" xmlns:r="http://schemas.openxmlformats.org/officeDocument/2006/relationships" xmlns:p="http://schemas.openxmlformats.org/presentationml/2006/main">
+  <p:cSld>
+    <p:spTree>
+      <p:nvGrpSpPr>
+        <p:cNvPr id="1" name="">
+          <a:extLst>
+            <a:ext uri="{FF2B5EF4-FFF2-40B4-BE49-F238E27FC236}">
+              <a16:creationId xmlns:a16="http://schemas.microsoft.com/office/drawing/2014/main" id="{E0FE4AE3-EB08-D90A-87AE-16A5D387C348}"/>
+            </a:ext>
+          </a:extLst>
+        </p:cNvPr>
+        <p:cNvGrpSpPr/>
+        <p:nvPr/>
+      </p:nvGrpSpPr>
+      <p:grpSpPr>
+        <a:xfrm>
+          <a:off x="0" y="0"/>
+          <a:ext cx="0" cy="0"/>
+          <a:chOff x="0" y="0"/>
+          <a:chExt cx="0" cy="0"/>
+        </a:xfrm>
+      </p:grpSpPr>
+      <p:pic>
+        <p:nvPicPr>
+          <p:cNvPr id="4" name="Picture 3" descr="A screen shot of a graph&#10;&#10;AI-generated content may be incorrect.">
+            <a:extLst>
+              <a:ext uri="{FF2B5EF4-FFF2-40B4-BE49-F238E27FC236}">
+                <a16:creationId xmlns:a16="http://schemas.microsoft.com/office/drawing/2014/main" id="{B1BF3542-B26D-9BDC-3B09-7CF91244035C}"/>
+              </a:ext>
+            </a:extLst>
+          </p:cNvPr>
+          <p:cNvPicPr>
+            <a:picLocks noChangeAspect="1"/>
+          </p:cNvPicPr>
+          <p:nvPr/>
+        </p:nvPicPr>
+        <p:blipFill>
+          <a:blip r:embed="rId2"/>
+          <a:srcRect l="22265" t="33012" r="25012" b="29424"/>
+          <a:stretch/>
+        </p:blipFill>
+        <p:spPr>
+          <a:xfrm>
+            <a:off x="4193930" y="2264020"/>
+            <a:ext cx="3615791" cy="2576145"/>
+          </a:xfrm>
+          <a:prstGeom prst="rect">
+            <a:avLst/>
+          </a:prstGeom>
+        </p:spPr>
+      </p:pic>
+      <p:sp>
+        <p:nvSpPr>
+          <p:cNvPr id="2" name="Rectangle 1">
+            <a:extLst>
+              <a:ext uri="{FF2B5EF4-FFF2-40B4-BE49-F238E27FC236}">
+                <a16:creationId xmlns:a16="http://schemas.microsoft.com/office/drawing/2014/main" id="{077106A8-75FF-7A7A-82A4-E3D0C7EC61F3}"/>
+              </a:ext>
+            </a:extLst>
+          </p:cNvPr>
+          <p:cNvSpPr/>
+          <p:nvPr/>
+        </p:nvSpPr>
+        <p:spPr>
+          <a:xfrm>
+            <a:off x="4193930" y="2264019"/>
+            <a:ext cx="3615791" cy="2576146"/>
+          </a:xfrm>
+          <a:prstGeom prst="rect">
+            <a:avLst/>
+          </a:prstGeom>
+          <a:noFill/>
+          <a:ln>
+            <a:solidFill>
+              <a:schemeClr val="tx2">
+                <a:lumMod val="50000"/>
+                <a:lumOff val="50000"/>
+              </a:schemeClr>
+            </a:solidFill>
+          </a:ln>
+        </p:spPr>
+        <p:style>
+          <a:lnRef idx="2">
+            <a:schemeClr val="accent1">
+              <a:shade val="15000"/>
+            </a:schemeClr>
+          </a:lnRef>
+          <a:fillRef idx="1">
+            <a:schemeClr val="accent1"/>
+          </a:fillRef>
+          <a:effectRef idx="0">
+            <a:schemeClr val="accent1"/>
+          </a:effectRef>
+          <a:fontRef idx="minor">
+            <a:schemeClr val="lt1"/>
+          </a:fontRef>
+        </p:style>
+        <p:txBody>
+          <a:bodyPr rtlCol="0" anchor="ctr"/>
+          <a:lstStyle/>
+          <a:p>
+            <a:pPr algn="ctr"/>
+            <a:endParaRPr lang="en-US"/>
+          </a:p>
+        </p:txBody>
+      </p:sp>
+    </p:spTree>
+    <p:extLst>
+      <p:ext uri="{BB962C8B-B14F-4D97-AF65-F5344CB8AC3E}">
+        <p14:creationId xmlns:p14="http://schemas.microsoft.com/office/powerpoint/2010/main" val="3981864939"/>
+      </p:ext>
+    </p:extLst>
+  </p:cSld>
+  <p:clrMapOvr>
+    <a:masterClrMapping/>
+  </p:clrMapOvr>
+</p:sld>
+</file>
+
+<file path=ppt/slides/slide9.xml><?xml version="1.0" encoding="utf-8"?>
+<p:sld xmlns:a="http://schemas.openxmlformats.org/drawingml/2006/main" xmlns:r="http://schemas.openxmlformats.org/officeDocument/2006/relationships" xmlns:p="http://schemas.openxmlformats.org/presentationml/2006/main">
+  <p:cSld>
+    <p:spTree>
+      <p:nvGrpSpPr>
+        <p:cNvPr id="1" name="">
+          <a:extLst>
+            <a:ext uri="{FF2B5EF4-FFF2-40B4-BE49-F238E27FC236}">
+              <a16:creationId xmlns:a16="http://schemas.microsoft.com/office/drawing/2014/main" id="{6C9AC71D-841B-8583-6A29-9FC0D75406BE}"/>
+            </a:ext>
+          </a:extLst>
+        </p:cNvPr>
+        <p:cNvGrpSpPr/>
+        <p:nvPr/>
+      </p:nvGrpSpPr>
+      <p:grpSpPr>
+        <a:xfrm>
+          <a:off x="0" y="0"/>
+          <a:ext cx="0" cy="0"/>
+          <a:chOff x="0" y="0"/>
+          <a:chExt cx="0" cy="0"/>
+        </a:xfrm>
+      </p:grpSpPr>
+      <p:pic>
+        <p:nvPicPr>
+          <p:cNvPr id="4" name="Picture 3" descr="A diagram of a building&#10;&#10;AI-generated content may be incorrect.">
+            <a:extLst>
+              <a:ext uri="{FF2B5EF4-FFF2-40B4-BE49-F238E27FC236}">
+                <a16:creationId xmlns:a16="http://schemas.microsoft.com/office/drawing/2014/main" id="{B814F596-4CE0-C350-3BFE-5F04C8D0A554}"/>
+              </a:ext>
+            </a:extLst>
+          </p:cNvPr>
+          <p:cNvPicPr>
+            <a:picLocks noChangeAspect="1"/>
+          </p:cNvPicPr>
+          <p:nvPr/>
+        </p:nvPicPr>
+        <p:blipFill>
+          <a:blip r:embed="rId2"/>
+          <a:srcRect l="22265" t="33013" r="25012" b="29423"/>
+          <a:stretch/>
+        </p:blipFill>
+        <p:spPr>
+          <a:xfrm>
+            <a:off x="4193930" y="2264018"/>
+            <a:ext cx="3615791" cy="2576147"/>
+          </a:xfrm>
+          <a:prstGeom prst="rect">
+            <a:avLst/>
+          </a:prstGeom>
+        </p:spPr>
+      </p:pic>
+      <p:sp>
+        <p:nvSpPr>
+          <p:cNvPr id="2" name="Rectangle 1">
+            <a:extLst>
+              <a:ext uri="{FF2B5EF4-FFF2-40B4-BE49-F238E27FC236}">
+                <a16:creationId xmlns:a16="http://schemas.microsoft.com/office/drawing/2014/main" id="{929E198C-C9F5-C0AA-8A45-D6AAB70523BE}"/>
+              </a:ext>
+            </a:extLst>
+          </p:cNvPr>
+          <p:cNvSpPr/>
+          <p:nvPr/>
+        </p:nvSpPr>
+        <p:spPr>
+          <a:xfrm>
+            <a:off x="4193930" y="2264019"/>
+            <a:ext cx="3615791" cy="2576146"/>
+          </a:xfrm>
+          <a:prstGeom prst="rect">
+            <a:avLst/>
+          </a:prstGeom>
+          <a:noFill/>
+          <a:ln>
+            <a:solidFill>
+              <a:schemeClr val="tx2">
+                <a:lumMod val="50000"/>
+                <a:lumOff val="50000"/>
+              </a:schemeClr>
+            </a:solidFill>
+          </a:ln>
+        </p:spPr>
+        <p:style>
+          <a:lnRef idx="2">
+            <a:schemeClr val="accent1">
+              <a:shade val="15000"/>
+            </a:schemeClr>
+          </a:lnRef>
+          <a:fillRef idx="1">
+            <a:schemeClr val="accent1"/>
+          </a:fillRef>
+          <a:effectRef idx="0">
+            <a:schemeClr val="accent1"/>
+          </a:effectRef>
+          <a:fontRef idx="minor">
+            <a:schemeClr val="lt1"/>
+          </a:fontRef>
+        </p:style>
+        <p:txBody>
+          <a:bodyPr rtlCol="0" anchor="ctr"/>
+          <a:lstStyle/>
+          <a:p>
+            <a:pPr algn="ctr"/>
+            <a:endParaRPr lang="en-US"/>
+          </a:p>
+        </p:txBody>
+      </p:sp>
+    </p:spTree>
+    <p:extLst>
+      <p:ext uri="{BB962C8B-B14F-4D97-AF65-F5344CB8AC3E}">
+        <p14:creationId xmlns:p14="http://schemas.microsoft.com/office/powerpoint/2010/main" val="3620517102"/>
       </p:ext>
     </p:extLst>
   </p:cSld>

</xml_diff>